<commit_message>
Make tree schemes in doc consistant with the code
</commit_message>
<xml_diff>
--- a/doc/introduction/images/trees/trees.pptx
+++ b/doc/introduction/images/trees/trees.pptx
@@ -247,7 +247,7 @@
           <a:p>
             <a:fld id="{E4018CAF-3730-4D24-BFDC-EECEE033AEB4}" type="datetimeFigureOut">
               <a:rPr lang="fr-FR" smtClean="0"/>
-              <a:t>03/03/2022</a:t>
+              <a:t>22/11/2022</a:t>
             </a:fld>
             <a:endParaRPr lang="fr-FR"/>
           </a:p>
@@ -417,7 +417,7 @@
           <a:p>
             <a:fld id="{E4018CAF-3730-4D24-BFDC-EECEE033AEB4}" type="datetimeFigureOut">
               <a:rPr lang="fr-FR" smtClean="0"/>
-              <a:t>03/03/2022</a:t>
+              <a:t>22/11/2022</a:t>
             </a:fld>
             <a:endParaRPr lang="fr-FR"/>
           </a:p>
@@ -597,7 +597,7 @@
           <a:p>
             <a:fld id="{E4018CAF-3730-4D24-BFDC-EECEE033AEB4}" type="datetimeFigureOut">
               <a:rPr lang="fr-FR" smtClean="0"/>
-              <a:t>03/03/2022</a:t>
+              <a:t>22/11/2022</a:t>
             </a:fld>
             <a:endParaRPr lang="fr-FR"/>
           </a:p>
@@ -767,7 +767,7 @@
           <a:p>
             <a:fld id="{E4018CAF-3730-4D24-BFDC-EECEE033AEB4}" type="datetimeFigureOut">
               <a:rPr lang="fr-FR" smtClean="0"/>
-              <a:t>03/03/2022</a:t>
+              <a:t>22/11/2022</a:t>
             </a:fld>
             <a:endParaRPr lang="fr-FR"/>
           </a:p>
@@ -1013,7 +1013,7 @@
           <a:p>
             <a:fld id="{E4018CAF-3730-4D24-BFDC-EECEE033AEB4}" type="datetimeFigureOut">
               <a:rPr lang="fr-FR" smtClean="0"/>
-              <a:t>03/03/2022</a:t>
+              <a:t>22/11/2022</a:t>
             </a:fld>
             <a:endParaRPr lang="fr-FR"/>
           </a:p>
@@ -1245,7 +1245,7 @@
           <a:p>
             <a:fld id="{E4018CAF-3730-4D24-BFDC-EECEE033AEB4}" type="datetimeFigureOut">
               <a:rPr lang="fr-FR" smtClean="0"/>
-              <a:t>03/03/2022</a:t>
+              <a:t>22/11/2022</a:t>
             </a:fld>
             <a:endParaRPr lang="fr-FR"/>
           </a:p>
@@ -1612,7 +1612,7 @@
           <a:p>
             <a:fld id="{E4018CAF-3730-4D24-BFDC-EECEE033AEB4}" type="datetimeFigureOut">
               <a:rPr lang="fr-FR" smtClean="0"/>
-              <a:t>03/03/2022</a:t>
+              <a:t>22/11/2022</a:t>
             </a:fld>
             <a:endParaRPr lang="fr-FR"/>
           </a:p>
@@ -1730,7 +1730,7 @@
           <a:p>
             <a:fld id="{E4018CAF-3730-4D24-BFDC-EECEE033AEB4}" type="datetimeFigureOut">
               <a:rPr lang="fr-FR" smtClean="0"/>
-              <a:t>03/03/2022</a:t>
+              <a:t>22/11/2022</a:t>
             </a:fld>
             <a:endParaRPr lang="fr-FR"/>
           </a:p>
@@ -1825,7 +1825,7 @@
           <a:p>
             <a:fld id="{E4018CAF-3730-4D24-BFDC-EECEE033AEB4}" type="datetimeFigureOut">
               <a:rPr lang="fr-FR" smtClean="0"/>
-              <a:t>03/03/2022</a:t>
+              <a:t>22/11/2022</a:t>
             </a:fld>
             <a:endParaRPr lang="fr-FR"/>
           </a:p>
@@ -2102,7 +2102,7 @@
           <a:p>
             <a:fld id="{E4018CAF-3730-4D24-BFDC-EECEE033AEB4}" type="datetimeFigureOut">
               <a:rPr lang="fr-FR" smtClean="0"/>
-              <a:t>03/03/2022</a:t>
+              <a:t>22/11/2022</a:t>
             </a:fld>
             <a:endParaRPr lang="fr-FR"/>
           </a:p>
@@ -2355,7 +2355,7 @@
           <a:p>
             <a:fld id="{E4018CAF-3730-4D24-BFDC-EECEE033AEB4}" type="datetimeFigureOut">
               <a:rPr lang="fr-FR" smtClean="0"/>
-              <a:t>03/03/2022</a:t>
+              <a:t>22/11/2022</a:t>
             </a:fld>
             <a:endParaRPr lang="fr-FR"/>
           </a:p>
@@ -2568,7 +2568,7 @@
           <a:p>
             <a:fld id="{E4018CAF-3730-4D24-BFDC-EECEE033AEB4}" type="datetimeFigureOut">
               <a:rPr lang="fr-FR" smtClean="0"/>
-              <a:t>03/03/2022</a:t>
+              <a:t>22/11/2022</a:t>
             </a:fld>
             <a:endParaRPr lang="fr-FR"/>
           </a:p>
@@ -3744,7 +3744,16 @@
                 </a:solidFill>
                 <a:latin typeface="Consolas" panose="020B0609020204030204" pitchFamily="49" charset="0"/>
               </a:rPr>
-              <a:t>Distribution</a:t>
+              <a:t>:</a:t>
+            </a:r>
+            <a:r>
+              <a:rPr lang="fr-FR" sz="1500" b="1" dirty="0" err="1" smtClean="0">
+                <a:solidFill>
+                  <a:srgbClr val="E41A1C"/>
+                </a:solidFill>
+                <a:latin typeface="Consolas" panose="020B0609020204030204" pitchFamily="49" charset="0"/>
+              </a:rPr>
+              <a:t>CGNS#Distribution</a:t>
             </a:r>
             <a:endParaRPr lang="fr-FR" sz="1500" b="1" dirty="0">
               <a:solidFill>
@@ -3996,7 +4005,16 @@
                 </a:solidFill>
                 <a:latin typeface="Consolas" panose="020B0609020204030204" pitchFamily="49" charset="0"/>
               </a:rPr>
-              <a:t>Distribution</a:t>
+              <a:t>:</a:t>
+            </a:r>
+            <a:r>
+              <a:rPr lang="fr-FR" sz="1500" b="1" dirty="0" err="1" smtClean="0">
+                <a:solidFill>
+                  <a:srgbClr val="E41A1C"/>
+                </a:solidFill>
+                <a:latin typeface="Consolas" panose="020B0609020204030204" pitchFamily="49" charset="0"/>
+              </a:rPr>
+              <a:t>CGNS#Distribution</a:t>
             </a:r>
             <a:endParaRPr lang="fr-FR" sz="1500" b="1" dirty="0">
               <a:solidFill>
@@ -4252,7 +4270,16 @@
                 </a:solidFill>
                 <a:latin typeface="Consolas" panose="020B0609020204030204" pitchFamily="49" charset="0"/>
               </a:rPr>
-              <a:t>Distribution</a:t>
+              <a:t>:</a:t>
+            </a:r>
+            <a:r>
+              <a:rPr lang="fr-FR" sz="1500" b="1" dirty="0" err="1" smtClean="0">
+                <a:solidFill>
+                  <a:srgbClr val="E41A1C"/>
+                </a:solidFill>
+                <a:latin typeface="Consolas" panose="020B0609020204030204" pitchFamily="49" charset="0"/>
+              </a:rPr>
+              <a:t>CGNS#Distribution</a:t>
             </a:r>
             <a:endParaRPr lang="fr-FR" sz="1500" b="1" dirty="0">
               <a:solidFill>
@@ -4542,17 +4569,38 @@
               <a:rPr lang="fr-FR" sz="1500" b="1" dirty="0" smtClean="0">
                 <a:latin typeface="Consolas" panose="020B0609020204030204" pitchFamily="49" charset="0"/>
               </a:rPr>
-              <a:t>    ├───</a:t>
+              <a:t>    </a:t>
             </a:r>
             <a:r>
               <a:rPr lang="fr-FR" sz="1500" b="1" dirty="0" smtClean="0">
+                <a:latin typeface="Consolas" panose="020B0609020204030204" pitchFamily="49" charset="0"/>
+              </a:rPr>
+              <a:t>├───</a:t>
+            </a:r>
+            <a:r>
+              <a:rPr lang="fr-FR" sz="1500" b="1" dirty="0" smtClean="0">
                 <a:solidFill>
                   <a:srgbClr val="E41A1C"/>
                 </a:solidFill>
                 <a:latin typeface="Consolas" panose="020B0609020204030204" pitchFamily="49" charset="0"/>
               </a:rPr>
-              <a:t>Distribution</a:t>
-            </a:r>
+              <a:t>:</a:t>
+            </a:r>
+            <a:r>
+              <a:rPr lang="fr-FR" sz="1500" b="1" dirty="0" err="1" smtClean="0">
+                <a:solidFill>
+                  <a:srgbClr val="E41A1C"/>
+                </a:solidFill>
+                <a:latin typeface="Consolas" panose="020B0609020204030204" pitchFamily="49" charset="0"/>
+              </a:rPr>
+              <a:t>CGNS#Distribution</a:t>
+            </a:r>
+            <a:endParaRPr lang="fr-FR" sz="1500" b="1" dirty="0" smtClean="0">
+              <a:solidFill>
+                <a:srgbClr val="E41A1C"/>
+              </a:solidFill>
+              <a:latin typeface="Consolas" panose="020B0609020204030204" pitchFamily="49" charset="0"/>
+            </a:endParaRPr>
           </a:p>
           <a:p>
             <a:pPr>
@@ -4755,17 +4803,38 @@
               <a:rPr lang="fr-FR" sz="1500" b="1" dirty="0" smtClean="0">
                 <a:latin typeface="Consolas" panose="020B0609020204030204" pitchFamily="49" charset="0"/>
               </a:rPr>
-              <a:t>    │   └───</a:t>
+              <a:t>    │   </a:t>
             </a:r>
             <a:r>
               <a:rPr lang="fr-FR" sz="1500" b="1" dirty="0" smtClean="0">
+                <a:latin typeface="Consolas" panose="020B0609020204030204" pitchFamily="49" charset="0"/>
+              </a:rPr>
+              <a:t>└───</a:t>
+            </a:r>
+            <a:r>
+              <a:rPr lang="fr-FR" sz="1500" b="1" dirty="0" smtClean="0">
                 <a:solidFill>
                   <a:srgbClr val="E41A1C"/>
                 </a:solidFill>
                 <a:latin typeface="Consolas" panose="020B0609020204030204" pitchFamily="49" charset="0"/>
               </a:rPr>
-              <a:t>Distribution</a:t>
-            </a:r>
+              <a:t>:</a:t>
+            </a:r>
+            <a:r>
+              <a:rPr lang="fr-FR" sz="1500" b="1" dirty="0" err="1" smtClean="0">
+                <a:solidFill>
+                  <a:srgbClr val="E41A1C"/>
+                </a:solidFill>
+                <a:latin typeface="Consolas" panose="020B0609020204030204" pitchFamily="49" charset="0"/>
+              </a:rPr>
+              <a:t>CGNS#Distribution</a:t>
+            </a:r>
+            <a:endParaRPr lang="fr-FR" sz="1500" b="1" dirty="0" smtClean="0">
+              <a:solidFill>
+                <a:srgbClr val="E41A1C"/>
+              </a:solidFill>
+              <a:latin typeface="Consolas" panose="020B0609020204030204" pitchFamily="49" charset="0"/>
+            </a:endParaRPr>
           </a:p>
           <a:p>
             <a:pPr>
@@ -4987,17 +5056,38 @@
               <a:rPr lang="fr-FR" sz="1500" b="1" dirty="0" smtClean="0">
                 <a:latin typeface="Consolas" panose="020B0609020204030204" pitchFamily="49" charset="0"/>
               </a:rPr>
-              <a:t>            ├───</a:t>
+              <a:t>            </a:t>
             </a:r>
             <a:r>
               <a:rPr lang="fr-FR" sz="1500" b="1" dirty="0" smtClean="0">
+                <a:latin typeface="Consolas" panose="020B0609020204030204" pitchFamily="49" charset="0"/>
+              </a:rPr>
+              <a:t>├───</a:t>
+            </a:r>
+            <a:r>
+              <a:rPr lang="fr-FR" sz="1500" b="1" dirty="0" smtClean="0">
                 <a:solidFill>
                   <a:srgbClr val="E41A1C"/>
                 </a:solidFill>
                 <a:latin typeface="Consolas" panose="020B0609020204030204" pitchFamily="49" charset="0"/>
               </a:rPr>
-              <a:t>Distribution</a:t>
-            </a:r>
+              <a:t>:</a:t>
+            </a:r>
+            <a:r>
+              <a:rPr lang="fr-FR" sz="1500" b="1" dirty="0" err="1" smtClean="0">
+                <a:solidFill>
+                  <a:srgbClr val="E41A1C"/>
+                </a:solidFill>
+                <a:latin typeface="Consolas" panose="020B0609020204030204" pitchFamily="49" charset="0"/>
+              </a:rPr>
+              <a:t>CGNS#Distribution</a:t>
+            </a:r>
+            <a:endParaRPr lang="fr-FR" sz="1500" b="1" dirty="0" smtClean="0">
+              <a:solidFill>
+                <a:srgbClr val="E41A1C"/>
+              </a:solidFill>
+              <a:latin typeface="Consolas" panose="020B0609020204030204" pitchFamily="49" charset="0"/>
+            </a:endParaRPr>
           </a:p>
           <a:p>
             <a:pPr>
@@ -5436,17 +5526,38 @@
               <a:rPr lang="fr-FR" sz="1500" b="1" dirty="0" smtClean="0">
                 <a:latin typeface="Consolas" panose="020B0609020204030204" pitchFamily="49" charset="0"/>
               </a:rPr>
-              <a:t>    ├───</a:t>
+              <a:t>    </a:t>
             </a:r>
             <a:r>
               <a:rPr lang="fr-FR" sz="1500" b="1" dirty="0" smtClean="0">
+                <a:latin typeface="Consolas" panose="020B0609020204030204" pitchFamily="49" charset="0"/>
+              </a:rPr>
+              <a:t>├───</a:t>
+            </a:r>
+            <a:r>
+              <a:rPr lang="fr-FR" sz="1500" b="1" dirty="0" smtClean="0">
                 <a:solidFill>
                   <a:srgbClr val="E41A1C"/>
                 </a:solidFill>
                 <a:latin typeface="Consolas" panose="020B0609020204030204" pitchFamily="49" charset="0"/>
               </a:rPr>
-              <a:t>Distribution</a:t>
-            </a:r>
+              <a:t>:</a:t>
+            </a:r>
+            <a:r>
+              <a:rPr lang="fr-FR" sz="1500" b="1" dirty="0" err="1" smtClean="0">
+                <a:solidFill>
+                  <a:srgbClr val="E41A1C"/>
+                </a:solidFill>
+                <a:latin typeface="Consolas" panose="020B0609020204030204" pitchFamily="49" charset="0"/>
+              </a:rPr>
+              <a:t>CGNS#Distribution</a:t>
+            </a:r>
+            <a:endParaRPr lang="fr-FR" sz="1500" b="1" dirty="0" smtClean="0">
+              <a:solidFill>
+                <a:srgbClr val="E41A1C"/>
+              </a:solidFill>
+              <a:latin typeface="Consolas" panose="020B0609020204030204" pitchFamily="49" charset="0"/>
+            </a:endParaRPr>
           </a:p>
           <a:p>
             <a:pPr>
@@ -5649,17 +5760,38 @@
               <a:rPr lang="fr-FR" sz="1500" b="1" dirty="0" smtClean="0">
                 <a:latin typeface="Consolas" panose="020B0609020204030204" pitchFamily="49" charset="0"/>
               </a:rPr>
-              <a:t>    │   └───</a:t>
+              <a:t>    │   </a:t>
             </a:r>
             <a:r>
               <a:rPr lang="fr-FR" sz="1500" b="1" dirty="0" smtClean="0">
+                <a:latin typeface="Consolas" panose="020B0609020204030204" pitchFamily="49" charset="0"/>
+              </a:rPr>
+              <a:t>└───</a:t>
+            </a:r>
+            <a:r>
+              <a:rPr lang="fr-FR" sz="1500" b="1" dirty="0" smtClean="0">
                 <a:solidFill>
                   <a:srgbClr val="E41A1C"/>
                 </a:solidFill>
                 <a:latin typeface="Consolas" panose="020B0609020204030204" pitchFamily="49" charset="0"/>
               </a:rPr>
-              <a:t>Distribution</a:t>
-            </a:r>
+              <a:t>:</a:t>
+            </a:r>
+            <a:r>
+              <a:rPr lang="fr-FR" sz="1500" b="1" dirty="0" err="1" smtClean="0">
+                <a:solidFill>
+                  <a:srgbClr val="E41A1C"/>
+                </a:solidFill>
+                <a:latin typeface="Consolas" panose="020B0609020204030204" pitchFamily="49" charset="0"/>
+              </a:rPr>
+              <a:t>CGNS#Distribution</a:t>
+            </a:r>
+            <a:endParaRPr lang="fr-FR" sz="1500" b="1" dirty="0" smtClean="0">
+              <a:solidFill>
+                <a:srgbClr val="E41A1C"/>
+              </a:solidFill>
+              <a:latin typeface="Consolas" panose="020B0609020204030204" pitchFamily="49" charset="0"/>
+            </a:endParaRPr>
           </a:p>
           <a:p>
             <a:pPr>
@@ -5881,17 +6013,38 @@
               <a:rPr lang="fr-FR" sz="1500" b="1" dirty="0" smtClean="0">
                 <a:latin typeface="Consolas" panose="020B0609020204030204" pitchFamily="49" charset="0"/>
               </a:rPr>
-              <a:t>            ├───</a:t>
+              <a:t>            </a:t>
             </a:r>
             <a:r>
               <a:rPr lang="fr-FR" sz="1500" b="1" dirty="0" smtClean="0">
+                <a:latin typeface="Consolas" panose="020B0609020204030204" pitchFamily="49" charset="0"/>
+              </a:rPr>
+              <a:t>├───</a:t>
+            </a:r>
+            <a:r>
+              <a:rPr lang="fr-FR" sz="1500" b="1" dirty="0" smtClean="0">
                 <a:solidFill>
                   <a:srgbClr val="E41A1C"/>
                 </a:solidFill>
                 <a:latin typeface="Consolas" panose="020B0609020204030204" pitchFamily="49" charset="0"/>
               </a:rPr>
-              <a:t>Distribution</a:t>
-            </a:r>
+              <a:t>:</a:t>
+            </a:r>
+            <a:r>
+              <a:rPr lang="fr-FR" sz="1500" b="1" dirty="0" err="1" smtClean="0">
+                <a:solidFill>
+                  <a:srgbClr val="E41A1C"/>
+                </a:solidFill>
+                <a:latin typeface="Consolas" panose="020B0609020204030204" pitchFamily="49" charset="0"/>
+              </a:rPr>
+              <a:t>CGNS#Distribution</a:t>
+            </a:r>
+            <a:endParaRPr lang="fr-FR" sz="1500" b="1" dirty="0" smtClean="0">
+              <a:solidFill>
+                <a:srgbClr val="E41A1C"/>
+              </a:solidFill>
+              <a:latin typeface="Consolas" panose="020B0609020204030204" pitchFamily="49" charset="0"/>
+            </a:endParaRPr>
           </a:p>
           <a:p>
             <a:pPr>
@@ -6050,8 +6203,8 @@
         </p:nvCxnSpPr>
         <p:spPr>
           <a:xfrm flipH="1">
-            <a:off x="2464526" y="735764"/>
-            <a:ext cx="4328159" cy="483436"/>
+            <a:off x="3274423" y="735764"/>
+            <a:ext cx="3518263" cy="415058"/>
           </a:xfrm>
           <a:prstGeom prst="straightConnector1">
             <a:avLst/>
@@ -6086,8 +6239,8 @@
         </p:nvCxnSpPr>
         <p:spPr>
           <a:xfrm flipH="1">
-            <a:off x="2882537" y="914325"/>
-            <a:ext cx="3958046" cy="2202143"/>
+            <a:off x="3603290" y="914325"/>
+            <a:ext cx="3237293" cy="2202143"/>
           </a:xfrm>
           <a:prstGeom prst="straightConnector1">
             <a:avLst/>
@@ -6122,8 +6275,8 @@
         </p:nvCxnSpPr>
         <p:spPr>
           <a:xfrm flipH="1">
-            <a:off x="3274423" y="986171"/>
-            <a:ext cx="3692436" cy="4282515"/>
+            <a:off x="4067959" y="986171"/>
+            <a:ext cx="2898900" cy="4352183"/>
           </a:xfrm>
           <a:prstGeom prst="straightConnector1">
             <a:avLst/>
@@ -7323,13 +7476,7 @@
               <a:rPr lang="fr-FR" sz="1500" dirty="0" smtClean="0">
                 <a:latin typeface="Consolas" panose="020B0609020204030204" pitchFamily="49" charset="0"/>
               </a:rPr>
-              <a:t> </a:t>
-            </a:r>
-            <a:r>
-              <a:rPr lang="fr-FR" sz="1500" dirty="0" smtClean="0">
-                <a:latin typeface="Consolas" panose="020B0609020204030204" pitchFamily="49" charset="0"/>
-              </a:rPr>
-              <a:t>[12 2 0]</a:t>
+              <a:t> [12 2 0]</a:t>
             </a:r>
           </a:p>
           <a:p>
@@ -7342,7 +7489,22 @@
               <a:rPr lang="fr-FR" sz="1500" b="1" dirty="0" smtClean="0">
                 <a:latin typeface="Consolas" panose="020B0609020204030204" pitchFamily="49" charset="0"/>
               </a:rPr>
-              <a:t>    ├───</a:t>
+              <a:t>    </a:t>
+            </a:r>
+            <a:r>
+              <a:rPr lang="fr-FR" sz="1500" b="1" dirty="0" smtClean="0">
+                <a:latin typeface="Consolas" panose="020B0609020204030204" pitchFamily="49" charset="0"/>
+              </a:rPr>
+              <a:t>├───</a:t>
+            </a:r>
+            <a:r>
+              <a:rPr lang="fr-FR" sz="1500" b="1" dirty="0" smtClean="0">
+                <a:solidFill>
+                  <a:srgbClr val="E41A1C"/>
+                </a:solidFill>
+                <a:latin typeface="Consolas" panose="020B0609020204030204" pitchFamily="49" charset="0"/>
+              </a:rPr>
+              <a:t>:</a:t>
             </a:r>
             <a:r>
               <a:rPr lang="fr-FR" sz="1500" b="1" dirty="0" err="1" smtClean="0">
@@ -7351,7 +7513,7 @@
                 </a:solidFill>
                 <a:latin typeface="Consolas" panose="020B0609020204030204" pitchFamily="49" charset="0"/>
               </a:rPr>
-              <a:t>GlobalNumbering</a:t>
+              <a:t>CGNS#GlobalNumbering</a:t>
             </a:r>
             <a:endParaRPr lang="fr-FR" sz="1500" b="1" dirty="0" smtClean="0">
               <a:solidFill>
@@ -7600,7 +7762,22 @@
               <a:rPr lang="fr-FR" sz="1500" b="1" dirty="0" smtClean="0">
                 <a:latin typeface="Consolas" panose="020B0609020204030204" pitchFamily="49" charset="0"/>
               </a:rPr>
-              <a:t>    │   └───</a:t>
+              <a:t>    │   </a:t>
+            </a:r>
+            <a:r>
+              <a:rPr lang="fr-FR" sz="1500" b="1" dirty="0" smtClean="0">
+                <a:latin typeface="Consolas" panose="020B0609020204030204" pitchFamily="49" charset="0"/>
+              </a:rPr>
+              <a:t>└───</a:t>
+            </a:r>
+            <a:r>
+              <a:rPr lang="fr-FR" sz="1500" b="1" dirty="0" smtClean="0">
+                <a:solidFill>
+                  <a:srgbClr val="E41A1C"/>
+                </a:solidFill>
+                <a:latin typeface="Consolas" panose="020B0609020204030204" pitchFamily="49" charset="0"/>
+              </a:rPr>
+              <a:t>:</a:t>
             </a:r>
             <a:r>
               <a:rPr lang="fr-FR" sz="1500" b="1" dirty="0" err="1" smtClean="0">
@@ -7609,7 +7786,7 @@
                 </a:solidFill>
                 <a:latin typeface="Consolas" panose="020B0609020204030204" pitchFamily="49" charset="0"/>
               </a:rPr>
-              <a:t>GlobalNumbering</a:t>
+              <a:t>CGNS#GlobalNumbering</a:t>
             </a:r>
             <a:endParaRPr lang="fr-FR" sz="1500" b="1" dirty="0" smtClean="0">
               <a:solidFill>
@@ -7838,7 +8015,22 @@
               <a:rPr lang="fr-FR" sz="1500" b="1" dirty="0" smtClean="0">
                 <a:latin typeface="Consolas" panose="020B0609020204030204" pitchFamily="49" charset="0"/>
               </a:rPr>
-              <a:t>            ├───</a:t>
+              <a:t>            </a:t>
+            </a:r>
+            <a:r>
+              <a:rPr lang="fr-FR" sz="1500" b="1" dirty="0" smtClean="0">
+                <a:latin typeface="Consolas" panose="020B0609020204030204" pitchFamily="49" charset="0"/>
+              </a:rPr>
+              <a:t>├───</a:t>
+            </a:r>
+            <a:r>
+              <a:rPr lang="fr-FR" sz="1500" b="1" dirty="0" smtClean="0">
+                <a:solidFill>
+                  <a:srgbClr val="E41A1C"/>
+                </a:solidFill>
+                <a:latin typeface="Consolas" panose="020B0609020204030204" pitchFamily="49" charset="0"/>
+              </a:rPr>
+              <a:t>:</a:t>
             </a:r>
             <a:r>
               <a:rPr lang="fr-FR" sz="1500" b="1" dirty="0" err="1" smtClean="0">
@@ -7847,7 +8039,7 @@
                 </a:solidFill>
                 <a:latin typeface="Consolas" panose="020B0609020204030204" pitchFamily="49" charset="0"/>
               </a:rPr>
-              <a:t>GlobalNumbering</a:t>
+              <a:t>CGNS#GlobalNumbering</a:t>
             </a:r>
             <a:endParaRPr lang="fr-FR" sz="1500" b="1" dirty="0" smtClean="0">
               <a:solidFill>
@@ -8189,13 +8381,22 @@
               <a:t>├───</a:t>
             </a:r>
             <a:r>
+              <a:rPr lang="fr-FR" sz="1500" b="1" dirty="0" smtClean="0">
+                <a:solidFill>
+                  <a:srgbClr val="E41A1C"/>
+                </a:solidFill>
+                <a:latin typeface="Consolas" panose="020B0609020204030204" pitchFamily="49" charset="0"/>
+              </a:rPr>
+              <a:t>:</a:t>
+            </a:r>
+            <a:r>
               <a:rPr lang="fr-FR" sz="1500" b="1" dirty="0" err="1" smtClean="0">
                 <a:solidFill>
                   <a:srgbClr val="E41A1C"/>
                 </a:solidFill>
                 <a:latin typeface="Consolas" panose="020B0609020204030204" pitchFamily="49" charset="0"/>
               </a:rPr>
-              <a:t>GlobalNumbering</a:t>
+              <a:t>CGNS#GlobalNumbering</a:t>
             </a:r>
             <a:endParaRPr lang="fr-FR" sz="1500" b="1" dirty="0">
               <a:solidFill>
@@ -8540,13 +8741,22 @@
               <a:t>└───</a:t>
             </a:r>
             <a:r>
+              <a:rPr lang="fr-FR" sz="1500" b="1" dirty="0" smtClean="0">
+                <a:solidFill>
+                  <a:srgbClr val="E41A1C"/>
+                </a:solidFill>
+                <a:latin typeface="Consolas" panose="020B0609020204030204" pitchFamily="49" charset="0"/>
+              </a:rPr>
+              <a:t>:</a:t>
+            </a:r>
+            <a:r>
               <a:rPr lang="fr-FR" sz="1500" b="1" dirty="0" err="1" smtClean="0">
                 <a:solidFill>
                   <a:srgbClr val="E41A1C"/>
                 </a:solidFill>
                 <a:latin typeface="Consolas" panose="020B0609020204030204" pitchFamily="49" charset="0"/>
               </a:rPr>
-              <a:t>GlobalNumbering</a:t>
+              <a:t>CGNS#GlobalNumbering</a:t>
             </a:r>
             <a:endParaRPr lang="fr-FR" sz="1500" b="1" dirty="0">
               <a:solidFill>
@@ -8835,13 +9045,22 @@
               <a:t>├───</a:t>
             </a:r>
             <a:r>
+              <a:rPr lang="fr-FR" sz="1500" b="1" dirty="0" smtClean="0">
+                <a:solidFill>
+                  <a:srgbClr val="E41A1C"/>
+                </a:solidFill>
+                <a:latin typeface="Consolas" panose="020B0609020204030204" pitchFamily="49" charset="0"/>
+              </a:rPr>
+              <a:t>:</a:t>
+            </a:r>
+            <a:r>
               <a:rPr lang="fr-FR" sz="1500" b="1" dirty="0" err="1" smtClean="0">
                 <a:solidFill>
                   <a:srgbClr val="E41A1C"/>
                 </a:solidFill>
                 <a:latin typeface="Consolas" panose="020B0609020204030204" pitchFamily="49" charset="0"/>
               </a:rPr>
-              <a:t>GlobalNumbering</a:t>
+              <a:t>CGNS#GlobalNumbering</a:t>
             </a:r>
             <a:endParaRPr lang="fr-FR" sz="1500" b="1" dirty="0">
               <a:solidFill>
@@ -9218,13 +9437,22 @@
               <a:t>├───</a:t>
             </a:r>
             <a:r>
+              <a:rPr lang="fr-FR" sz="1500" b="1" dirty="0" smtClean="0">
+                <a:solidFill>
+                  <a:srgbClr val="E41A1C"/>
+                </a:solidFill>
+                <a:latin typeface="Consolas" panose="020B0609020204030204" pitchFamily="49" charset="0"/>
+              </a:rPr>
+              <a:t>:</a:t>
+            </a:r>
+            <a:r>
               <a:rPr lang="fr-FR" sz="1500" b="1" dirty="0" err="1" smtClean="0">
                 <a:solidFill>
                   <a:srgbClr val="E41A1C"/>
                 </a:solidFill>
                 <a:latin typeface="Consolas" panose="020B0609020204030204" pitchFamily="49" charset="0"/>
               </a:rPr>
-              <a:t>GlobalNumbering</a:t>
+              <a:t>CGNS#GlobalNumbering</a:t>
             </a:r>
             <a:endParaRPr lang="fr-FR" sz="1500" b="1" dirty="0">
               <a:solidFill>
@@ -9569,13 +9797,22 @@
               <a:t>└───</a:t>
             </a:r>
             <a:r>
+              <a:rPr lang="fr-FR" sz="1500" b="1" dirty="0" smtClean="0">
+                <a:solidFill>
+                  <a:srgbClr val="E41A1C"/>
+                </a:solidFill>
+                <a:latin typeface="Consolas" panose="020B0609020204030204" pitchFamily="49" charset="0"/>
+              </a:rPr>
+              <a:t>:</a:t>
+            </a:r>
+            <a:r>
               <a:rPr lang="fr-FR" sz="1500" b="1" dirty="0" err="1" smtClean="0">
                 <a:solidFill>
                   <a:srgbClr val="E41A1C"/>
                 </a:solidFill>
                 <a:latin typeface="Consolas" panose="020B0609020204030204" pitchFamily="49" charset="0"/>
               </a:rPr>
-              <a:t>GlobalNumbering</a:t>
+              <a:t>CGNS#GlobalNumbering</a:t>
             </a:r>
             <a:endParaRPr lang="fr-FR" sz="1500" b="1" dirty="0">
               <a:solidFill>
@@ -9864,13 +10101,22 @@
               <a:t>├───</a:t>
             </a:r>
             <a:r>
+              <a:rPr lang="fr-FR" sz="1500" b="1" dirty="0" smtClean="0">
+                <a:solidFill>
+                  <a:srgbClr val="E41A1C"/>
+                </a:solidFill>
+                <a:latin typeface="Consolas" panose="020B0609020204030204" pitchFamily="49" charset="0"/>
+              </a:rPr>
+              <a:t>:</a:t>
+            </a:r>
+            <a:r>
               <a:rPr lang="fr-FR" sz="1500" b="1" dirty="0" err="1" smtClean="0">
                 <a:solidFill>
                   <a:srgbClr val="E41A1C"/>
                 </a:solidFill>
                 <a:latin typeface="Consolas" panose="020B0609020204030204" pitchFamily="49" charset="0"/>
               </a:rPr>
-              <a:t>GlobalNumbering</a:t>
+              <a:t>CGNS#GlobalNumbering</a:t>
             </a:r>
             <a:endParaRPr lang="fr-FR" sz="1500" b="1" dirty="0">
               <a:solidFill>
@@ -10041,8 +10287,8 @@
         </p:nvCxnSpPr>
         <p:spPr>
           <a:xfrm flipH="1" flipV="1">
-            <a:off x="2751909" y="1227909"/>
-            <a:ext cx="4259799" cy="83862"/>
+            <a:off x="3413760" y="1199213"/>
+            <a:ext cx="3597949" cy="112558"/>
           </a:xfrm>
           <a:prstGeom prst="straightConnector1">
             <a:avLst/>
@@ -10077,8 +10323,8 @@
         </p:nvCxnSpPr>
         <p:spPr>
           <a:xfrm flipH="1">
-            <a:off x="3169920" y="1311769"/>
-            <a:ext cx="3949950" cy="1850493"/>
+            <a:off x="3972393" y="1311769"/>
+            <a:ext cx="3147477" cy="1850493"/>
           </a:xfrm>
           <a:prstGeom prst="straightConnector1">
             <a:avLst/>
@@ -10113,8 +10359,8 @@
         </p:nvCxnSpPr>
         <p:spPr>
           <a:xfrm flipH="1">
-            <a:off x="3603292" y="1396051"/>
-            <a:ext cx="3545118" cy="3849727"/>
+            <a:off x="4347148" y="1396051"/>
+            <a:ext cx="2801262" cy="3849727"/>
           </a:xfrm>
           <a:prstGeom prst="straightConnector1">
             <a:avLst/>
@@ -10320,7 +10566,16 @@
                 </a:solidFill>
                 <a:latin typeface="Consolas" panose="020B0609020204030204" pitchFamily="49" charset="0"/>
               </a:rPr>
-              <a:t> for all </a:t>
+              <a:t> </a:t>
+            </a:r>
+            <a:r>
+              <a:rPr lang="fr-FR" sz="1600" dirty="0" smtClean="0">
+                <a:solidFill>
+                  <a:srgbClr val="377EB8"/>
+                </a:solidFill>
+                <a:latin typeface="Consolas" panose="020B0609020204030204" pitchFamily="49" charset="0"/>
+              </a:rPr>
+              <a:t>for all </a:t>
             </a:r>
             <a:r>
               <a:rPr lang="fr-FR" sz="1600" dirty="0" err="1" smtClean="0">
@@ -10572,7 +10827,16 @@
                 </a:solidFill>
                 <a:latin typeface="Consolas" panose="020B0609020204030204" pitchFamily="49" charset="0"/>
               </a:rPr>
-              <a:t> for all </a:t>
+              <a:t> </a:t>
+            </a:r>
+            <a:r>
+              <a:rPr lang="fr-FR" sz="1600" dirty="0" smtClean="0">
+                <a:solidFill>
+                  <a:srgbClr val="00B050"/>
+                </a:solidFill>
+                <a:latin typeface="Consolas" panose="020B0609020204030204" pitchFamily="49" charset="0"/>
+              </a:rPr>
+              <a:t>for all </a:t>
             </a:r>
             <a:r>
               <a:rPr lang="fr-FR" sz="1600" dirty="0" err="1" smtClean="0">
@@ -10782,7 +11046,16 @@
                 </a:solidFill>
                 <a:latin typeface="Consolas" panose="020B0609020204030204" pitchFamily="49" charset="0"/>
               </a:rPr>
-              <a:t> for </a:t>
+              <a:t> </a:t>
+            </a:r>
+            <a:r>
+              <a:rPr lang="fr-FR" sz="1600" dirty="0" smtClean="0">
+                <a:solidFill>
+                  <a:srgbClr val="984EA3"/>
+                </a:solidFill>
+                <a:latin typeface="Consolas" panose="020B0609020204030204" pitchFamily="49" charset="0"/>
+              </a:rPr>
+              <a:t>for </a:t>
             </a:r>
             <a:r>
               <a:rPr lang="fr-FR" sz="1600" dirty="0" err="1" smtClean="0">
@@ -10859,7 +11132,16 @@
                 </a:solidFill>
                 <a:latin typeface="Consolas" panose="020B0609020204030204" pitchFamily="49" charset="0"/>
               </a:rPr>
-              <a:t> for </a:t>
+              <a:t> </a:t>
+            </a:r>
+            <a:r>
+              <a:rPr lang="fr-FR" sz="1600" dirty="0" smtClean="0">
+                <a:solidFill>
+                  <a:srgbClr val="FF7F00"/>
+                </a:solidFill>
+                <a:latin typeface="Consolas" panose="020B0609020204030204" pitchFamily="49" charset="0"/>
+              </a:rPr>
+              <a:t>for </a:t>
             </a:r>
             <a:r>
               <a:rPr lang="fr-FR" sz="1600" dirty="0" err="1" smtClean="0">

</xml_diff>